<commit_message>
Rewrite 1st lecture in latex
</commit_message>
<xml_diff>
--- a/lectures/1/MaM_Project.pptx
+++ b/lectures/1/MaM_Project.pptx
@@ -282,6 +282,11 @@
       </a:defRPr>
     </a:lvl9pPr>
   </p:defaultTextStyle>
+  <p:extLst>
+    <p:ext uri="{EFAFB233-063F-42B5-8137-9DF3F51BA10A}">
+      <p15:sldGuideLst xmlns:p15="http://schemas.microsoft.com/office/powerpoint/2012/main"/>
+    </p:ext>
+  </p:extLst>
 </p:presentation>
 </file>
 
@@ -6615,7 +6620,7 @@
         </p:nvSpPr>
         <p:spPr>
           <a:xfrm>
-            <a:off x="424375" y="960475"/>
+            <a:off x="424375" y="839250"/>
             <a:ext cx="8262000" cy="3465000"/>
           </a:xfrm>
           <a:prstGeom prst="rect">
@@ -6639,7 +6644,7 @@
               <a:buAutoNum type="arabicParenR"/>
             </a:pPr>
             <a:r>
-              <a:rPr lang="en-US" sz="1300" dirty="0"/>
+              <a:rPr lang="en-US" sz="1100" dirty="0"/>
               <a:t>Prepare CAD model render</a:t>
             </a:r>
           </a:p>
@@ -6655,25 +6660,29 @@
               <a:buAutoNum type="arabicParenR"/>
             </a:pPr>
             <a:r>
-              <a:rPr lang="ru" sz="1300" b="1" dirty="0"/>
+              <a:rPr lang="ru" sz="1100" b="1" dirty="0"/>
               <a:t>Prepare </a:t>
             </a:r>
             <a:r>
-              <a:rPr lang="en-US" sz="1300" b="1" dirty="0"/>
+              <a:rPr lang="en-US" sz="1100" b="1" dirty="0"/>
               <a:t>slides </a:t>
             </a:r>
             <a:r>
-              <a:rPr lang="ru" sz="1300" b="1" dirty="0"/>
+              <a:rPr lang="ru" sz="1100" b="1" dirty="0"/>
               <a:t>(</a:t>
             </a:r>
             <a:r>
-              <a:rPr lang="en-US" sz="1300" b="1" dirty="0"/>
-              <a:t>7 min, strict)</a:t>
-            </a:r>
-            <a:endParaRPr sz="1300" b="1" dirty="0"/>
-          </a:p>
-          <a:p>
-            <a:pPr marL="914400" lvl="1" indent="-311150" algn="l" rtl="0">
+              <a:rPr lang="ru-RU" sz="1100" b="1" dirty="0"/>
+              <a:t>10</a:t>
+            </a:r>
+            <a:r>
+              <a:rPr lang="en-US" sz="1100" b="1" dirty="0"/>
+              <a:t> min, strict)</a:t>
+            </a:r>
+            <a:endParaRPr sz="1100" b="1" dirty="0"/>
+          </a:p>
+          <a:p>
+            <a:pPr marL="603250" lvl="1" indent="0" algn="l" rtl="0">
               <a:spcBef>
                 <a:spcPts val="0"/>
               </a:spcBef>
@@ -6681,16 +6690,15 @@
                 <a:spcPts val="0"/>
               </a:spcAft>
               <a:buSzPts val="1300"/>
-              <a:buAutoNum type="alphaLcParenR"/>
-            </a:pPr>
-            <a:r>
-              <a:rPr lang="ru" sz="1300" dirty="0"/>
-              <a:t>Your original idea</a:t>
-            </a:r>
-            <a:endParaRPr sz="1300" dirty="0"/>
-          </a:p>
-          <a:p>
-            <a:pPr marL="914400" lvl="1" indent="-311150" algn="l" rtl="0">
+              <a:buNone/>
+            </a:pPr>
+            <a:r>
+              <a:rPr lang="en-US" sz="1100" dirty="0"/>
+              <a:t>1) 1-4 slides: Explain your original idea</a:t>
+            </a:r>
+          </a:p>
+          <a:p>
+            <a:pPr marL="603250" lvl="1" indent="0" algn="l" rtl="0">
               <a:spcBef>
                 <a:spcPts val="0"/>
               </a:spcBef>
@@ -6698,16 +6706,15 @@
                 <a:spcPts val="0"/>
               </a:spcAft>
               <a:buSzPts val="1300"/>
-              <a:buAutoNum type="alphaLcParenR"/>
-            </a:pPr>
-            <a:r>
-              <a:rPr lang="ru" sz="1300" dirty="0"/>
-              <a:t>Challenges and how did you solve them</a:t>
-            </a:r>
-            <a:endParaRPr sz="1300" dirty="0"/>
-          </a:p>
-          <a:p>
-            <a:pPr marL="914400" lvl="1" indent="-311150" algn="l" rtl="0">
+              <a:buNone/>
+            </a:pPr>
+            <a:r>
+              <a:rPr lang="en-US" sz="1100" dirty="0"/>
+              <a:t>2) How it transforms during the semester (if)</a:t>
+            </a:r>
+          </a:p>
+          <a:p>
+            <a:pPr marL="603250" lvl="1" indent="0" algn="l" rtl="0">
               <a:spcBef>
                 <a:spcPts val="0"/>
               </a:spcBef>
@@ -6715,16 +6722,15 @@
                 <a:spcPts val="0"/>
               </a:spcAft>
               <a:buSzPts val="1300"/>
-              <a:buAutoNum type="alphaLcParenR"/>
-            </a:pPr>
-            <a:r>
-              <a:rPr lang="ru" sz="1300" dirty="0"/>
-              <a:t>What changed related to original idea</a:t>
-            </a:r>
-            <a:endParaRPr sz="1300" dirty="0"/>
-          </a:p>
-          <a:p>
-            <a:pPr marL="914400" lvl="1" indent="-311150" algn="l" rtl="0">
+              <a:buNone/>
+            </a:pPr>
+            <a:r>
+              <a:rPr lang="en-US" sz="1100" dirty="0"/>
+              <a:t>3) Kinematics</a:t>
+            </a:r>
+          </a:p>
+          <a:p>
+            <a:pPr marL="603250" lvl="1" indent="0" algn="l" rtl="0">
               <a:spcBef>
                 <a:spcPts val="0"/>
               </a:spcBef>
@@ -6732,16 +6738,19 @@
                 <a:spcPts val="0"/>
               </a:spcAft>
               <a:buSzPts val="1300"/>
-              <a:buAutoNum type="alphaLcParenR"/>
-            </a:pPr>
-            <a:r>
-              <a:rPr lang="ru" sz="1300" dirty="0"/>
-              <a:t>What did you learn from the project and the course</a:t>
-            </a:r>
-            <a:endParaRPr sz="1300" dirty="0"/>
-          </a:p>
-          <a:p>
-            <a:pPr marL="914400" lvl="1" indent="-311150" algn="l" rtl="0">
+              <a:buNone/>
+            </a:pPr>
+            <a:r>
+              <a:rPr lang="ru-RU" sz="1100" dirty="0"/>
+              <a:t>	</a:t>
+            </a:r>
+            <a:r>
+              <a:rPr lang="en-US" sz="1100" dirty="0"/>
+              <a:t>a) 1-2 slides : proposal - what did you try to find, the purpose</a:t>
+            </a:r>
+          </a:p>
+          <a:p>
+            <a:pPr marL="603250" lvl="1" indent="0" algn="l" rtl="0">
               <a:spcBef>
                 <a:spcPts val="0"/>
               </a:spcBef>
@@ -6749,16 +6758,19 @@
                 <a:spcPts val="0"/>
               </a:spcAft>
               <a:buSzPts val="1300"/>
-              <a:buAutoNum type="alphaLcParenR"/>
-            </a:pPr>
-            <a:r>
-              <a:rPr lang="ru" sz="1300" dirty="0"/>
-              <a:t>Present your mechanism</a:t>
-            </a:r>
-            <a:endParaRPr lang="en-US" sz="1300" dirty="0"/>
-          </a:p>
-          <a:p>
-            <a:pPr marL="914400" lvl="1" indent="-311150" algn="l" rtl="0">
+              <a:buNone/>
+            </a:pPr>
+            <a:r>
+              <a:rPr lang="ru-RU" sz="1100" dirty="0"/>
+              <a:t>	</a:t>
+            </a:r>
+            <a:r>
+              <a:rPr lang="en-US" sz="1100" dirty="0"/>
+              <a:t>b) 1-2 slides: solution (video if exists) (without formulas)</a:t>
+            </a:r>
+          </a:p>
+          <a:p>
+            <a:pPr marL="603250" lvl="1" indent="0" algn="l" rtl="0">
               <a:spcBef>
                 <a:spcPts val="0"/>
               </a:spcBef>
@@ -6766,16 +6778,15 @@
                 <a:spcPts val="0"/>
               </a:spcAft>
               <a:buSzPts val="1300"/>
-              <a:buAutoNum type="alphaLcParenR"/>
-            </a:pPr>
-            <a:r>
-              <a:rPr lang="en-US" sz="1300" dirty="0"/>
-              <a:t>Present your CAD render</a:t>
-            </a:r>
-            <a:endParaRPr sz="1300" dirty="0"/>
-          </a:p>
-          <a:p>
-            <a:pPr marL="914400" lvl="1" indent="-311150" algn="l" rtl="0">
+              <a:buNone/>
+            </a:pPr>
+            <a:r>
+              <a:rPr lang="en-US" sz="1100" dirty="0"/>
+              <a:t>4) Dynamics</a:t>
+            </a:r>
+          </a:p>
+          <a:p>
+            <a:pPr marL="603250" lvl="1" indent="0" algn="l" rtl="0">
               <a:spcBef>
                 <a:spcPts val="0"/>
               </a:spcBef>
@@ -6783,17 +6794,156 @@
                 <a:spcPts val="0"/>
               </a:spcAft>
               <a:buSzPts val="1300"/>
-              <a:buFont typeface="Arial"/>
-              <a:buAutoNum type="alphaLcParenR"/>
-            </a:pPr>
-            <a:r>
-              <a:rPr lang="ru" sz="1300" dirty="0"/>
-              <a:t>What would you do in other way if you had such project again</a:t>
-            </a:r>
-            <a:br>
-              <a:rPr lang="ru" sz="1300" b="1" dirty="0"/>
-            </a:br>
-            <a:endParaRPr sz="1300" dirty="0"/>
+              <a:buNone/>
+            </a:pPr>
+            <a:r>
+              <a:rPr lang="ru-RU" sz="1100" dirty="0"/>
+              <a:t>	</a:t>
+            </a:r>
+            <a:r>
+              <a:rPr lang="en-US" sz="1100" dirty="0"/>
+              <a:t>a) 1-2 slides : proposal - what did you try to find, the purpose</a:t>
+            </a:r>
+          </a:p>
+          <a:p>
+            <a:pPr marL="603250" lvl="1" indent="0" algn="l" rtl="0">
+              <a:spcBef>
+                <a:spcPts val="0"/>
+              </a:spcBef>
+              <a:spcAft>
+                <a:spcPts val="0"/>
+              </a:spcAft>
+              <a:buSzPts val="1300"/>
+              <a:buNone/>
+            </a:pPr>
+            <a:r>
+              <a:rPr lang="ru-RU" sz="1100" dirty="0"/>
+              <a:t>	</a:t>
+            </a:r>
+            <a:r>
+              <a:rPr lang="en-US" sz="1100" dirty="0"/>
+              <a:t>b) 1-2 slides: solution coding (video if exists) (without formulas)</a:t>
+            </a:r>
+          </a:p>
+          <a:p>
+            <a:pPr marL="603250" lvl="1" indent="0" algn="l" rtl="0">
+              <a:spcBef>
+                <a:spcPts val="0"/>
+              </a:spcBef>
+              <a:spcAft>
+                <a:spcPts val="0"/>
+              </a:spcAft>
+              <a:buSzPts val="1300"/>
+              <a:buNone/>
+            </a:pPr>
+            <a:r>
+              <a:rPr lang="ru-RU" sz="1100" dirty="0"/>
+              <a:t>	</a:t>
+            </a:r>
+            <a:r>
+              <a:rPr lang="en-US" sz="1100" dirty="0"/>
+              <a:t>c) 1-2 slides: solution NX</a:t>
+            </a:r>
+          </a:p>
+          <a:p>
+            <a:pPr marL="603250" lvl="1" indent="0" algn="l" rtl="0">
+              <a:spcBef>
+                <a:spcPts val="0"/>
+              </a:spcBef>
+              <a:spcAft>
+                <a:spcPts val="0"/>
+              </a:spcAft>
+              <a:buSzPts val="1300"/>
+              <a:buNone/>
+            </a:pPr>
+            <a:r>
+              <a:rPr lang="ru-RU" sz="1100" dirty="0"/>
+              <a:t>	</a:t>
+            </a:r>
+            <a:r>
+              <a:rPr lang="en-US" sz="1100" dirty="0"/>
+              <a:t>d) 1 slides: compare solutions. Justify results</a:t>
+            </a:r>
+          </a:p>
+          <a:p>
+            <a:pPr marL="603250" lvl="1" indent="0" algn="l" rtl="0">
+              <a:spcBef>
+                <a:spcPts val="0"/>
+              </a:spcBef>
+              <a:spcAft>
+                <a:spcPts val="0"/>
+              </a:spcAft>
+              <a:buSzPts val="1300"/>
+              <a:buNone/>
+            </a:pPr>
+            <a:r>
+              <a:rPr lang="en-US" sz="1100" dirty="0"/>
+              <a:t>5) CAE: 1-3 slides: proposal, strain diagram</a:t>
+            </a:r>
+          </a:p>
+          <a:p>
+            <a:pPr marL="603250" lvl="1" indent="0" algn="l" rtl="0">
+              <a:spcBef>
+                <a:spcPts val="0"/>
+              </a:spcBef>
+              <a:spcAft>
+                <a:spcPts val="0"/>
+              </a:spcAft>
+              <a:buSzPts val="1300"/>
+              <a:buNone/>
+            </a:pPr>
+            <a:r>
+              <a:rPr lang="en-US" sz="1100" dirty="0"/>
+              <a:t>6) Render</a:t>
+            </a:r>
+          </a:p>
+          <a:p>
+            <a:pPr marL="603250" lvl="1" indent="0" algn="l" rtl="0">
+              <a:spcBef>
+                <a:spcPts val="0"/>
+              </a:spcBef>
+              <a:spcAft>
+                <a:spcPts val="0"/>
+              </a:spcAft>
+              <a:buSzPts val="1300"/>
+              <a:buNone/>
+            </a:pPr>
+            <a:r>
+              <a:rPr lang="en-US" sz="1100" dirty="0"/>
+              <a:t>7) Video of working mechanism (due the reason, that in a big audience, not everyone will see the mechanism)</a:t>
+            </a:r>
+          </a:p>
+          <a:p>
+            <a:pPr marL="603250" lvl="1" indent="0" algn="l" rtl="0">
+              <a:spcBef>
+                <a:spcPts val="0"/>
+              </a:spcBef>
+              <a:spcAft>
+                <a:spcPts val="0"/>
+              </a:spcAft>
+              <a:buSzPts val="1300"/>
+              <a:buNone/>
+            </a:pPr>
+            <a:r>
+              <a:rPr lang="en-US" sz="1100" dirty="0"/>
+              <a:t>8) 1-2 slides: What did you learn from the project and the course</a:t>
+            </a:r>
+          </a:p>
+          <a:p>
+            <a:pPr marL="603250" lvl="1" indent="0" algn="l" rtl="0">
+              <a:spcBef>
+                <a:spcPts val="0"/>
+              </a:spcBef>
+              <a:spcAft>
+                <a:spcPts val="0"/>
+              </a:spcAft>
+              <a:buSzPts val="1300"/>
+              <a:buNone/>
+            </a:pPr>
+            <a:r>
+              <a:rPr lang="en-US" sz="1100" dirty="0"/>
+              <a:t>9) What would you do in other way if you had such project again</a:t>
+            </a:r>
           </a:p>
         </p:txBody>
       </p:sp>

</xml_diff>